<commit_message>
ajout de couleur dans certaines slides
</commit_message>
<xml_diff>
--- a/Chapitre 4.pptx
+++ b/Chapitre 4.pptx
@@ -271,7 +271,7 @@
           <a:p>
             <a:fld id="{0CFB4D9B-4D0F-4330-BE60-A3BB8C2FF8A7}" type="datetimeFigureOut">
               <a:rPr lang="fr-BE" smtClean="0"/>
-              <a:t>20-11-25</a:t>
+              <a:t>21-11-25</a:t>
             </a:fld>
             <a:endParaRPr lang="fr-BE"/>
           </a:p>
@@ -899,7 +899,7 @@
           <a:p>
             <a:fld id="{D782A682-DD39-4819-89F0-642635859CB9}" type="datetimeFigureOut">
               <a:rPr lang="fr-BE" smtClean="0"/>
-              <a:t>20-11-25</a:t>
+              <a:t>21-11-25</a:t>
             </a:fld>
             <a:endParaRPr lang="fr-BE"/>
           </a:p>
@@ -1099,7 +1099,7 @@
           <a:p>
             <a:fld id="{D782A682-DD39-4819-89F0-642635859CB9}" type="datetimeFigureOut">
               <a:rPr lang="fr-BE" smtClean="0"/>
-              <a:t>20-11-25</a:t>
+              <a:t>21-11-25</a:t>
             </a:fld>
             <a:endParaRPr lang="fr-BE"/>
           </a:p>
@@ -1309,7 +1309,7 @@
           <a:p>
             <a:fld id="{D782A682-DD39-4819-89F0-642635859CB9}" type="datetimeFigureOut">
               <a:rPr lang="fr-BE" smtClean="0"/>
-              <a:t>20-11-25</a:t>
+              <a:t>21-11-25</a:t>
             </a:fld>
             <a:endParaRPr lang="fr-BE"/>
           </a:p>
@@ -1509,7 +1509,7 @@
           <a:p>
             <a:fld id="{D782A682-DD39-4819-89F0-642635859CB9}" type="datetimeFigureOut">
               <a:rPr lang="fr-BE" smtClean="0"/>
-              <a:t>20-11-25</a:t>
+              <a:t>21-11-25</a:t>
             </a:fld>
             <a:endParaRPr lang="fr-BE"/>
           </a:p>
@@ -1785,7 +1785,7 @@
           <a:p>
             <a:fld id="{D782A682-DD39-4819-89F0-642635859CB9}" type="datetimeFigureOut">
               <a:rPr lang="fr-BE" smtClean="0"/>
-              <a:t>20-11-25</a:t>
+              <a:t>21-11-25</a:t>
             </a:fld>
             <a:endParaRPr lang="fr-BE"/>
           </a:p>
@@ -2053,7 +2053,7 @@
           <a:p>
             <a:fld id="{D782A682-DD39-4819-89F0-642635859CB9}" type="datetimeFigureOut">
               <a:rPr lang="fr-BE" smtClean="0"/>
-              <a:t>20-11-25</a:t>
+              <a:t>21-11-25</a:t>
             </a:fld>
             <a:endParaRPr lang="fr-BE"/>
           </a:p>
@@ -2468,7 +2468,7 @@
           <a:p>
             <a:fld id="{D782A682-DD39-4819-89F0-642635859CB9}" type="datetimeFigureOut">
               <a:rPr lang="fr-BE" smtClean="0"/>
-              <a:t>20-11-25</a:t>
+              <a:t>21-11-25</a:t>
             </a:fld>
             <a:endParaRPr lang="fr-BE"/>
           </a:p>
@@ -2610,7 +2610,7 @@
           <a:p>
             <a:fld id="{D782A682-DD39-4819-89F0-642635859CB9}" type="datetimeFigureOut">
               <a:rPr lang="fr-BE" smtClean="0"/>
-              <a:t>20-11-25</a:t>
+              <a:t>21-11-25</a:t>
             </a:fld>
             <a:endParaRPr lang="fr-BE"/>
           </a:p>
@@ -2723,7 +2723,7 @@
           <a:p>
             <a:fld id="{D782A682-DD39-4819-89F0-642635859CB9}" type="datetimeFigureOut">
               <a:rPr lang="fr-BE" smtClean="0"/>
-              <a:t>20-11-25</a:t>
+              <a:t>21-11-25</a:t>
             </a:fld>
             <a:endParaRPr lang="fr-BE"/>
           </a:p>
@@ -3036,7 +3036,7 @@
           <a:p>
             <a:fld id="{D782A682-DD39-4819-89F0-642635859CB9}" type="datetimeFigureOut">
               <a:rPr lang="fr-BE" smtClean="0"/>
-              <a:t>20-11-25</a:t>
+              <a:t>21-11-25</a:t>
             </a:fld>
             <a:endParaRPr lang="fr-BE"/>
           </a:p>
@@ -3325,7 +3325,7 @@
           <a:p>
             <a:fld id="{D782A682-DD39-4819-89F0-642635859CB9}" type="datetimeFigureOut">
               <a:rPr lang="fr-BE" smtClean="0"/>
-              <a:t>20-11-25</a:t>
+              <a:t>21-11-25</a:t>
             </a:fld>
             <a:endParaRPr lang="fr-BE"/>
           </a:p>
@@ -3568,7 +3568,7 @@
           <a:p>
             <a:fld id="{D782A682-DD39-4819-89F0-642635859CB9}" type="datetimeFigureOut">
               <a:rPr lang="fr-BE" smtClean="0"/>
-              <a:t>20-11-25</a:t>
+              <a:t>21-11-25</a:t>
             </a:fld>
             <a:endParaRPr lang="fr-BE"/>
           </a:p>
@@ -12962,7 +12962,14 @@
           <a:p>
             <a:pPr lvl="2"/>
             <a:r>
-              <a:rPr lang="fr-BE" dirty="0"/>
+              <a:rPr lang="fr-BE" dirty="0">
+                <a:solidFill>
+                  <a:schemeClr val="accent3">
+                    <a:lumMod val="60000"/>
+                    <a:lumOff val="40000"/>
+                  </a:schemeClr>
+                </a:solidFill>
+              </a:rPr>
               <a:t>Git init</a:t>
             </a:r>
           </a:p>
@@ -12983,8 +12990,19 @@
           <a:p>
             <a:pPr lvl="2"/>
             <a:r>
+              <a:rPr lang="fr-BE" dirty="0">
+                <a:solidFill>
+                  <a:schemeClr val="accent3">
+                    <a:lumMod val="60000"/>
+                    <a:lumOff val="40000"/>
+                  </a:schemeClr>
+                </a:solidFill>
+              </a:rPr>
+              <a:t>Git clone &lt;url&gt; </a:t>
+            </a:r>
+            <a:r>
               <a:rPr lang="fr-BE" dirty="0"/>
-              <a:t>Git clone &lt;url&gt; par ex : https://github.com/libgit2/libgit2</a:t>
+              <a:t>par ex : https://github.com/libgit2/libgit2</a:t>
             </a:r>
           </a:p>
           <a:p>
@@ -13004,7 +13022,14 @@
           <a:p>
             <a:pPr lvl="2"/>
             <a:r>
-              <a:rPr lang="fr-BE" dirty="0"/>
+              <a:rPr lang="fr-BE" dirty="0">
+                <a:solidFill>
+                  <a:schemeClr val="accent3">
+                    <a:lumMod val="60000"/>
+                    <a:lumOff val="40000"/>
+                  </a:schemeClr>
+                </a:solidFill>
+              </a:rPr>
               <a:t>Git log [--online –graph]</a:t>
             </a:r>
           </a:p>
@@ -13597,7 +13622,14 @@
           <a:p>
             <a:pPr lvl="2"/>
             <a:r>
-              <a:rPr lang="nb-NO" dirty="0"/>
+              <a:rPr lang="nb-NO" dirty="0">
+                <a:solidFill>
+                  <a:schemeClr val="accent3">
+                    <a:lumMod val="60000"/>
+                    <a:lumOff val="40000"/>
+                  </a:schemeClr>
+                </a:solidFill>
+              </a:rPr>
               <a:t>git restore</a:t>
             </a:r>
           </a:p>
@@ -13611,7 +13643,14 @@
           <a:p>
             <a:pPr lvl="2"/>
             <a:r>
-              <a:rPr lang="nb-NO" dirty="0"/>
+              <a:rPr lang="nb-NO" dirty="0">
+                <a:solidFill>
+                  <a:schemeClr val="accent3">
+                    <a:lumMod val="60000"/>
+                    <a:lumOff val="40000"/>
+                  </a:schemeClr>
+                </a:solidFill>
+              </a:rPr>
               <a:t>git reset</a:t>
             </a:r>
           </a:p>
@@ -13632,7 +13671,14 @@
           <a:p>
             <a:pPr lvl="2"/>
             <a:r>
-              <a:rPr lang="nb-NO" dirty="0"/>
+              <a:rPr lang="nb-NO" dirty="0">
+                <a:solidFill>
+                  <a:schemeClr val="accent3">
+                    <a:lumMod val="60000"/>
+                    <a:lumOff val="40000"/>
+                  </a:schemeClr>
+                </a:solidFill>
+              </a:rPr>
               <a:t>git revert</a:t>
             </a:r>
           </a:p>
@@ -14241,14 +14287,35 @@
           <a:p>
             <a:pPr lvl="3"/>
             <a:r>
-              <a:rPr lang="fr-BE" dirty="0"/>
+              <a:rPr lang="fr-BE" dirty="0">
+                <a:solidFill>
+                  <a:schemeClr val="accent3">
+                    <a:lumMod val="60000"/>
+                    <a:lumOff val="40000"/>
+                  </a:schemeClr>
+                </a:solidFill>
+              </a:rPr>
               <a:t>Git </a:t>
             </a:r>
             <a:r>
-              <a:rPr lang="fr-BE" dirty="0" err="1"/>
+              <a:rPr lang="fr-BE" dirty="0" err="1">
+                <a:solidFill>
+                  <a:schemeClr val="accent3">
+                    <a:lumMod val="60000"/>
+                    <a:lumOff val="40000"/>
+                  </a:schemeClr>
+                </a:solidFill>
+              </a:rPr>
               <a:t>fetch</a:t>
             </a:r>
-            <a:endParaRPr lang="fr-BE" dirty="0"/>
+            <a:endParaRPr lang="fr-BE" dirty="0">
+              <a:solidFill>
+                <a:schemeClr val="accent3">
+                  <a:lumMod val="60000"/>
+                  <a:lumOff val="40000"/>
+                </a:schemeClr>
+              </a:solidFill>
+            </a:endParaRPr>
           </a:p>
           <a:p>
             <a:pPr lvl="4"/>
@@ -14260,7 +14327,14 @@
           <a:p>
             <a:pPr lvl="3"/>
             <a:r>
-              <a:rPr lang="fr-BE" dirty="0"/>
+              <a:rPr lang="fr-BE" dirty="0">
+                <a:solidFill>
+                  <a:schemeClr val="accent3">
+                    <a:lumMod val="60000"/>
+                    <a:lumOff val="40000"/>
+                  </a:schemeClr>
+                </a:solidFill>
+              </a:rPr>
               <a:t>Git pull</a:t>
             </a:r>
           </a:p>
@@ -14274,7 +14348,14 @@
           <a:p>
             <a:pPr lvl="3"/>
             <a:r>
-              <a:rPr lang="fr-BE" dirty="0"/>
+              <a:rPr lang="fr-BE" dirty="0">
+                <a:solidFill>
+                  <a:schemeClr val="accent3">
+                    <a:lumMod val="60000"/>
+                    <a:lumOff val="40000"/>
+                  </a:schemeClr>
+                </a:solidFill>
+              </a:rPr>
               <a:t>Git push</a:t>
             </a:r>
           </a:p>
@@ -17456,7 +17537,7 @@
           <p:nvPr/>
         </p:nvPicPr>
         <p:blipFill>
-          <a:blip r:embed="rId4">
+          <a:blip r:embed="rId3">
             <a:extLst>
               <a:ext uri="{28A0092B-C50C-407E-A947-70E740481C1C}">
                 <a14:useLocalDpi xmlns:a14="http://schemas.microsoft.com/office/drawing/2010/main" val="0"/>
@@ -17492,7 +17573,7 @@
           <p:nvPr/>
         </p:nvPicPr>
         <p:blipFill>
-          <a:blip r:embed="rId5">
+          <a:blip r:embed="rId4">
             <a:extLst>
               <a:ext uri="{28A0092B-C50C-407E-A947-70E740481C1C}">
                 <a14:useLocalDpi xmlns:a14="http://schemas.microsoft.com/office/drawing/2010/main" val="0"/>
@@ -17528,7 +17609,7 @@
           <p:nvPr/>
         </p:nvPicPr>
         <p:blipFill>
-          <a:blip r:embed="rId6">
+          <a:blip r:embed="rId5">
             <a:extLst>
               <a:ext uri="{28A0092B-C50C-407E-A947-70E740481C1C}">
                 <a14:useLocalDpi xmlns:a14="http://schemas.microsoft.com/office/drawing/2010/main" val="0"/>
@@ -17917,7 +17998,7 @@
   </p:timing>
   <p:extLst>
     <p:ext uri="{6950BFC3-D8DA-4A85-94F7-54DA5524770B}">
-      <p188:commentRel xmlns:p188="http://schemas.microsoft.com/office/powerpoint/2018/8/main" r:id="rId3"/>
+      <p188:commentRel xmlns:p188="http://schemas.microsoft.com/office/powerpoint/2018/8/main" xmlns="" r:id="rId6"/>
     </p:ext>
   </p:extLst>
 </p:sld>

</xml_diff>